<commit_message>
rm doc/.DS_Store and update scripts and ms files
</commit_message>
<xml_diff>
--- a/doc/manuscript/ArcInc_newFigs_31-03-2020.pptx
+++ b/doc/manuscript/ArcInc_newFigs_31-03-2020.pptx
@@ -195,7 +195,7 @@
           <a:p>
             <a:fld id="{A928E7D2-C405-8D43-85AB-B05FF9623B19}" type="datetimeFigureOut">
               <a:rPr lang="en-US" smtClean="0"/>
-              <a:t>3/31/20</a:t>
+              <a:t>4/22/20</a:t>
             </a:fld>
             <a:endParaRPr lang="en-US"/>
           </a:p>
@@ -638,31 +638,10 @@
           </a:p>
           <a:p>
             <a:r>
-              <a:rPr lang="en-US" baseline="0" dirty="0" smtClean="0"/>
-              <a:t>consider pairing with pre vs. main </a:t>
-            </a:r>
-            <a:r>
-              <a:rPr lang="en-US" baseline="0" dirty="0" err="1" smtClean="0"/>
-              <a:t>inc</a:t>
-            </a:r>
-            <a:r>
-              <a:rPr lang="en-US" baseline="0" dirty="0" smtClean="0"/>
-              <a:t> </a:t>
-            </a:r>
-            <a:r>
-              <a:rPr lang="en-US" baseline="0" dirty="0" err="1" smtClean="0"/>
-              <a:t>iso</a:t>
-            </a:r>
-            <a:r>
-              <a:rPr lang="en-US" baseline="0" dirty="0" smtClean="0"/>
-              <a:t> plots</a:t>
-            </a:r>
-          </a:p>
-          <a:p>
-            <a:r>
-              <a:rPr lang="en-US" baseline="0" dirty="0" smtClean="0"/>
-              <a:t>Not much different from </a:t>
-            </a:r>
+              <a:rPr lang="en-US" baseline="0" smtClean="0"/>
+              <a:t>updated 22-Apr-2020</a:t>
+            </a:r>
+            <a:endParaRPr lang="en-US" baseline="0" dirty="0" smtClean="0"/>
           </a:p>
         </p:txBody>
       </p:sp>
@@ -750,7 +729,6 @@
               <a:rPr lang="en-US" dirty="0" smtClean="0"/>
               <a:t>800x450</a:t>
             </a:r>
-            <a:endParaRPr lang="en-US" dirty="0" smtClean="0"/>
           </a:p>
         </p:txBody>
       </p:sp>
@@ -1088,7 +1066,7 @@
           <a:p>
             <a:fld id="{E1CDF098-BA46-3C4D-888C-4173552C68BE}" type="datetimeFigureOut">
               <a:rPr lang="en-US" smtClean="0"/>
-              <a:t>3/31/20</a:t>
+              <a:t>4/22/20</a:t>
             </a:fld>
             <a:endParaRPr lang="en-US"/>
           </a:p>
@@ -1258,7 +1236,7 @@
           <a:p>
             <a:fld id="{E1CDF098-BA46-3C4D-888C-4173552C68BE}" type="datetimeFigureOut">
               <a:rPr lang="en-US" smtClean="0"/>
-              <a:t>3/31/20</a:t>
+              <a:t>4/22/20</a:t>
             </a:fld>
             <a:endParaRPr lang="en-US"/>
           </a:p>
@@ -1438,7 +1416,7 @@
           <a:p>
             <a:fld id="{E1CDF098-BA46-3C4D-888C-4173552C68BE}" type="datetimeFigureOut">
               <a:rPr lang="en-US" smtClean="0"/>
-              <a:t>3/31/20</a:t>
+              <a:t>4/22/20</a:t>
             </a:fld>
             <a:endParaRPr lang="en-US"/>
           </a:p>
@@ -1608,7 +1586,7 @@
           <a:p>
             <a:fld id="{E1CDF098-BA46-3C4D-888C-4173552C68BE}" type="datetimeFigureOut">
               <a:rPr lang="en-US" smtClean="0"/>
-              <a:t>3/31/20</a:t>
+              <a:t>4/22/20</a:t>
             </a:fld>
             <a:endParaRPr lang="en-US"/>
           </a:p>
@@ -1854,7 +1832,7 @@
           <a:p>
             <a:fld id="{E1CDF098-BA46-3C4D-888C-4173552C68BE}" type="datetimeFigureOut">
               <a:rPr lang="en-US" smtClean="0"/>
-              <a:t>3/31/20</a:t>
+              <a:t>4/22/20</a:t>
             </a:fld>
             <a:endParaRPr lang="en-US"/>
           </a:p>
@@ -2142,7 +2120,7 @@
           <a:p>
             <a:fld id="{E1CDF098-BA46-3C4D-888C-4173552C68BE}" type="datetimeFigureOut">
               <a:rPr lang="en-US" smtClean="0"/>
-              <a:t>3/31/20</a:t>
+              <a:t>4/22/20</a:t>
             </a:fld>
             <a:endParaRPr lang="en-US"/>
           </a:p>
@@ -2564,7 +2542,7 @@
           <a:p>
             <a:fld id="{E1CDF098-BA46-3C4D-888C-4173552C68BE}" type="datetimeFigureOut">
               <a:rPr lang="en-US" smtClean="0"/>
-              <a:t>3/31/20</a:t>
+              <a:t>4/22/20</a:t>
             </a:fld>
             <a:endParaRPr lang="en-US"/>
           </a:p>
@@ -2682,7 +2660,7 @@
           <a:p>
             <a:fld id="{E1CDF098-BA46-3C4D-888C-4173552C68BE}" type="datetimeFigureOut">
               <a:rPr lang="en-US" smtClean="0"/>
-              <a:t>3/31/20</a:t>
+              <a:t>4/22/20</a:t>
             </a:fld>
             <a:endParaRPr lang="en-US"/>
           </a:p>
@@ -2777,7 +2755,7 @@
           <a:p>
             <a:fld id="{E1CDF098-BA46-3C4D-888C-4173552C68BE}" type="datetimeFigureOut">
               <a:rPr lang="en-US" smtClean="0"/>
-              <a:t>3/31/20</a:t>
+              <a:t>4/22/20</a:t>
             </a:fld>
             <a:endParaRPr lang="en-US"/>
           </a:p>
@@ -3054,7 +3032,7 @@
           <a:p>
             <a:fld id="{E1CDF098-BA46-3C4D-888C-4173552C68BE}" type="datetimeFigureOut">
               <a:rPr lang="en-US" smtClean="0"/>
-              <a:t>3/31/20</a:t>
+              <a:t>4/22/20</a:t>
             </a:fld>
             <a:endParaRPr lang="en-US"/>
           </a:p>
@@ -3307,7 +3285,7 @@
           <a:p>
             <a:fld id="{E1CDF098-BA46-3C4D-888C-4173552C68BE}" type="datetimeFigureOut">
               <a:rPr lang="en-US" smtClean="0"/>
-              <a:t>3/31/20</a:t>
+              <a:t>4/22/20</a:t>
             </a:fld>
             <a:endParaRPr lang="en-US"/>
           </a:p>
@@ -3520,7 +3498,7 @@
           <a:p>
             <a:fld id="{E1CDF098-BA46-3C4D-888C-4173552C68BE}" type="datetimeFigureOut">
               <a:rPr lang="en-US" smtClean="0"/>
-              <a:t>3/31/20</a:t>
+              <a:t>4/22/20</a:t>
             </a:fld>
             <a:endParaRPr lang="en-US"/>
           </a:p>
@@ -4882,7 +4860,7 @@
       </p:sp>
       <p:pic>
         <p:nvPicPr>
-          <p:cNvPr id="5" name="Picture 4"/>
+          <p:cNvPr id="3" name="Picture 2"/>
           <p:cNvPicPr>
             <a:picLocks noChangeAspect="1"/>
           </p:cNvPicPr>
@@ -4896,8 +4874,8 @@
         </p:blipFill>
         <p:spPr>
           <a:xfrm>
-            <a:off x="0" y="1143000"/>
-            <a:ext cx="9144000" cy="5715000"/>
+            <a:off x="0" y="1258143"/>
+            <a:ext cx="9144000" cy="5646057"/>
           </a:xfrm>
           <a:prstGeom prst="rect">
             <a:avLst/>

</xml_diff>